<commit_message>
05 - presentation modifications
</commit_message>
<xml_diff>
--- a/_Presentations/05 Working with files.pptx
+++ b/_Presentations/05 Working with files.pptx
@@ -12179,7 +12179,37 @@
             </a:pPr>
             <a:r>
               <a:rPr lang="en-US" dirty="0"/>
-              <a:t>Create a program that reads information about students</a:t>
+              <a:t>Create a program that </a:t>
+            </a:r>
+          </a:p>
+          <a:p>
+            <a:pPr marL="463550" indent="-342900">
+              <a:buFont typeface="+mj-lt"/>
+              <a:buAutoNum type="arabicPeriod"/>
+            </a:pPr>
+            <a:r>
+              <a:rPr lang="en-US" dirty="0"/>
+              <a:t>Allow user to enter information about students from the console</a:t>
+            </a:r>
+          </a:p>
+          <a:p>
+            <a:pPr marL="463550" indent="-342900">
+              <a:buFont typeface="+mj-lt"/>
+              <a:buAutoNum type="arabicPeriod"/>
+            </a:pPr>
+            <a:r>
+              <a:rPr lang="en-US" dirty="0"/>
+              <a:t>Store data into text file</a:t>
+            </a:r>
+          </a:p>
+          <a:p>
+            <a:pPr marL="463550" indent="-342900">
+              <a:buFont typeface="+mj-lt"/>
+              <a:buAutoNum type="arabicPeriod"/>
+            </a:pPr>
+            <a:r>
+              <a:rPr lang="en-US" dirty="0"/>
+              <a:t>Reads information about students from text file</a:t>
             </a:r>
           </a:p>
           <a:p>
@@ -12220,33 +12250,6 @@
               <a:buAutoNum type="arabicPeriod"/>
             </a:pPr>
             <a:endParaRPr lang="en-US" dirty="0"/>
-          </a:p>
-          <a:p>
-            <a:pPr marL="463550" indent="-342900">
-              <a:buFont typeface="+mj-lt"/>
-              <a:buAutoNum type="arabicPeriod"/>
-            </a:pPr>
-            <a:r>
-              <a:rPr lang="en-US" dirty="0"/>
-              <a:t>Store data into text file</a:t>
-            </a:r>
-          </a:p>
-          <a:p>
-            <a:pPr marL="463550" indent="-342900">
-              <a:buFont typeface="+mj-lt"/>
-              <a:buAutoNum type="arabicPeriod"/>
-            </a:pPr>
-            <a:endParaRPr lang="en-US" dirty="0"/>
-          </a:p>
-          <a:p>
-            <a:pPr marL="463550" indent="-342900">
-              <a:buFont typeface="+mj-lt"/>
-              <a:buAutoNum type="arabicPeriod"/>
-            </a:pPr>
-            <a:r>
-              <a:rPr lang="en-US" dirty="0"/>
-              <a:t>Read data from text file</a:t>
-            </a:r>
           </a:p>
           <a:p>
             <a:pPr marL="463550" indent="-342900">

</xml_diff>